<commit_message>
Enforce 15-word limit (including title) for Solution Overview sub-items
Fixed virtual-desktop Solution Overview Key Components:
- Host Pools & Session Hosts: 17→15 words (removed 'Azure VMs running', simplified)
- FSLogix & Azure Files: 16→15 words (removed 'SMB-based', 'seamless')
- Azure AD & Monitoring: 15 words (already compliant, refined for clarity)

Verification results (title + content):
✅ document-intelligence: 7-11 words (all compliant)
✅ enterprise-landing-zone: 6-13 words (all compliant)
✅ sentinel-siem: 6-15 words (all compliant)
✅ enterprise-platform: 7-13 words (all compliant)
✅ virtual-desktop: 10-15 words (NOW compliant after fixes)
✅ virtual-wan-global: 7-14 words (all compliant)

All 36 sub-items across 6 Azure solutions now meet the 15-word limit (including titles).

🤖 Generated with Claude Code (https://claude.com/claude-code)

Co-Authored-By: Claude <noreply@anthropic.com>
</commit_message>
<xml_diff>
--- a/solutions/azure/modern-workspace/virtual-desktop/presales/solution-briefing.pptx
+++ b/solutions/azure/modern-workspace/virtual-desktop/presales/solution-briefing.pptx
@@ -4828,7 +4828,7 @@
               <a:t>Host Pools &amp; Session Hosts:</a:t>
             </a:r>
             <a:r>
-              <a:t> Pooled or personal desktop configurations with Azure VMs running Windows 10/11 Multi-session</a:t>
+              <a:t> Pooled or personal desktop configurations with Windows 10/11 Multi-session VMs</a:t>
             </a:r>
           </a:p>
           <a:p>
@@ -4838,7 +4838,7 @@
               <a:t>FSLogix &amp; Azure Files:</a:t>
             </a:r>
             <a:r>
-              <a:t> Profile containers with SMB-based storage for persistent user data and seamless roaming</a:t>
+              <a:t> Profile containers with SMB storage for persistent user data and roaming</a:t>
             </a:r>
           </a:p>
           <a:p>
@@ -4848,7 +4848,7 @@
               <a:t>Azure AD &amp; Monitoring:</a:t>
             </a:r>
             <a:r>
-              <a:t> Enterprise identity management with conditional access policies and real-time performance diagnostics</a:t>
+              <a:t> Enterprise identity with conditional access and real-time performance diagnostics</a:t>
             </a:r>
           </a:p>
           <a:p>

</xml_diff>